<commit_message>
updating the enrichseq logo
</commit_message>
<xml_diff>
--- a/figures/EnrichSeq.pptx
+++ b/figures/EnrichSeq.pptx
@@ -8,6 +8,7 @@
     <p:sldId id="256" r:id="rId2"/>
     <p:sldId id="257" r:id="rId3"/>
     <p:sldId id="258" r:id="rId4"/>
+    <p:sldId id="259" r:id="rId5"/>
   </p:sldIdLst>
   <p:sldSz cx="12192000" cy="6858000"/>
   <p:notesSz cx="6858000" cy="9144000"/>
@@ -106,6 +107,11 @@
       </a:defRPr>
     </a:lvl9pPr>
   </p:defaultTextStyle>
+  <p:extLst>
+    <p:ext uri="{EFAFB233-063F-42B5-8137-9DF3F51BA10A}">
+      <p15:sldGuideLst xmlns:p15="http://schemas.microsoft.com/office/powerpoint/2012/main"/>
+    </p:ext>
+  </p:extLst>
 </p:presentation>
 </file>
 
@@ -256,7 +262,7 @@
           <a:p>
             <a:fld id="{0F17E9D9-2B70-B44E-B3A9-3C8C14D2464B}" type="datetimeFigureOut">
               <a:rPr lang="en-US" smtClean="0"/>
-              <a:t>9/19/21</a:t>
+              <a:t>11/9/21</a:t>
             </a:fld>
             <a:endParaRPr lang="en-US"/>
           </a:p>
@@ -454,7 +460,7 @@
           <a:p>
             <a:fld id="{0F17E9D9-2B70-B44E-B3A9-3C8C14D2464B}" type="datetimeFigureOut">
               <a:rPr lang="en-US" smtClean="0"/>
-              <a:t>9/19/21</a:t>
+              <a:t>11/9/21</a:t>
             </a:fld>
             <a:endParaRPr lang="en-US"/>
           </a:p>
@@ -662,7 +668,7 @@
           <a:p>
             <a:fld id="{0F17E9D9-2B70-B44E-B3A9-3C8C14D2464B}" type="datetimeFigureOut">
               <a:rPr lang="en-US" smtClean="0"/>
-              <a:t>9/19/21</a:t>
+              <a:t>11/9/21</a:t>
             </a:fld>
             <a:endParaRPr lang="en-US"/>
           </a:p>
@@ -860,7 +866,7 @@
           <a:p>
             <a:fld id="{0F17E9D9-2B70-B44E-B3A9-3C8C14D2464B}" type="datetimeFigureOut">
               <a:rPr lang="en-US" smtClean="0"/>
-              <a:t>9/19/21</a:t>
+              <a:t>11/9/21</a:t>
             </a:fld>
             <a:endParaRPr lang="en-US"/>
           </a:p>
@@ -1135,7 +1141,7 @@
           <a:p>
             <a:fld id="{0F17E9D9-2B70-B44E-B3A9-3C8C14D2464B}" type="datetimeFigureOut">
               <a:rPr lang="en-US" smtClean="0"/>
-              <a:t>9/19/21</a:t>
+              <a:t>11/9/21</a:t>
             </a:fld>
             <a:endParaRPr lang="en-US"/>
           </a:p>
@@ -1400,7 +1406,7 @@
           <a:p>
             <a:fld id="{0F17E9D9-2B70-B44E-B3A9-3C8C14D2464B}" type="datetimeFigureOut">
               <a:rPr lang="en-US" smtClean="0"/>
-              <a:t>9/19/21</a:t>
+              <a:t>11/9/21</a:t>
             </a:fld>
             <a:endParaRPr lang="en-US"/>
           </a:p>
@@ -1812,7 +1818,7 @@
           <a:p>
             <a:fld id="{0F17E9D9-2B70-B44E-B3A9-3C8C14D2464B}" type="datetimeFigureOut">
               <a:rPr lang="en-US" smtClean="0"/>
-              <a:t>9/19/21</a:t>
+              <a:t>11/9/21</a:t>
             </a:fld>
             <a:endParaRPr lang="en-US"/>
           </a:p>
@@ -1953,7 +1959,7 @@
           <a:p>
             <a:fld id="{0F17E9D9-2B70-B44E-B3A9-3C8C14D2464B}" type="datetimeFigureOut">
               <a:rPr lang="en-US" smtClean="0"/>
-              <a:t>9/19/21</a:t>
+              <a:t>11/9/21</a:t>
             </a:fld>
             <a:endParaRPr lang="en-US"/>
           </a:p>
@@ -2066,7 +2072,7 @@
           <a:p>
             <a:fld id="{0F17E9D9-2B70-B44E-B3A9-3C8C14D2464B}" type="datetimeFigureOut">
               <a:rPr lang="en-US" smtClean="0"/>
-              <a:t>9/19/21</a:t>
+              <a:t>11/9/21</a:t>
             </a:fld>
             <a:endParaRPr lang="en-US"/>
           </a:p>
@@ -2377,7 +2383,7 @@
           <a:p>
             <a:fld id="{0F17E9D9-2B70-B44E-B3A9-3C8C14D2464B}" type="datetimeFigureOut">
               <a:rPr lang="en-US" smtClean="0"/>
-              <a:t>9/19/21</a:t>
+              <a:t>11/9/21</a:t>
             </a:fld>
             <a:endParaRPr lang="en-US"/>
           </a:p>
@@ -2665,7 +2671,7 @@
           <a:p>
             <a:fld id="{0F17E9D9-2B70-B44E-B3A9-3C8C14D2464B}" type="datetimeFigureOut">
               <a:rPr lang="en-US" smtClean="0"/>
-              <a:t>9/19/21</a:t>
+              <a:t>11/9/21</a:t>
             </a:fld>
             <a:endParaRPr lang="en-US"/>
           </a:p>
@@ -2906,7 +2912,7 @@
           <a:p>
             <a:fld id="{0F17E9D9-2B70-B44E-B3A9-3C8C14D2464B}" type="datetimeFigureOut">
               <a:rPr lang="en-US" smtClean="0"/>
-              <a:t>9/19/21</a:t>
+              <a:t>11/9/21</a:t>
             </a:fld>
             <a:endParaRPr lang="en-US"/>
           </a:p>
@@ -6034,6 +6040,2491 @@
     <p:extLst>
       <p:ext uri="{BB962C8B-B14F-4D97-AF65-F5344CB8AC3E}">
         <p14:creationId xmlns:p14="http://schemas.microsoft.com/office/powerpoint/2010/main" val="633794272"/>
+      </p:ext>
+    </p:extLst>
+  </p:cSld>
+  <p:clrMapOvr>
+    <a:masterClrMapping/>
+  </p:clrMapOvr>
+</p:sld>
+</file>
+
+<file path=ppt/slides/slide4.xml><?xml version="1.0" encoding="utf-8"?>
+<p:sld xmlns:a="http://schemas.openxmlformats.org/drawingml/2006/main" xmlns:r="http://schemas.openxmlformats.org/officeDocument/2006/relationships" xmlns:p="http://schemas.openxmlformats.org/presentationml/2006/main">
+  <p:cSld>
+    <p:spTree>
+      <p:nvGrpSpPr>
+        <p:cNvPr id="1" name=""/>
+        <p:cNvGrpSpPr/>
+        <p:nvPr/>
+      </p:nvGrpSpPr>
+      <p:grpSpPr>
+        <a:xfrm>
+          <a:off x="0" y="0"/>
+          <a:ext cx="0" cy="0"/>
+          <a:chOff x="0" y="0"/>
+          <a:chExt cx="0" cy="0"/>
+        </a:xfrm>
+      </p:grpSpPr>
+      <p:sp>
+        <p:nvSpPr>
+          <p:cNvPr id="28" name="Preparation 27">
+            <a:extLst>
+              <a:ext uri="{FF2B5EF4-FFF2-40B4-BE49-F238E27FC236}">
+                <a16:creationId xmlns:a16="http://schemas.microsoft.com/office/drawing/2014/main" id="{27600EC1-A5F0-CA47-A456-A80476E218CA}"/>
+              </a:ext>
+            </a:extLst>
+          </p:cNvPr>
+          <p:cNvSpPr/>
+          <p:nvPr/>
+        </p:nvSpPr>
+        <p:spPr>
+          <a:xfrm rot="16200000">
+            <a:off x="502168" y="2713923"/>
+            <a:ext cx="523815" cy="453445"/>
+          </a:xfrm>
+          <a:prstGeom prst="flowChartPreparation">
+            <a:avLst/>
+          </a:prstGeom>
+          <a:solidFill>
+            <a:schemeClr val="accent1">
+              <a:lumMod val="20000"/>
+              <a:lumOff val="80000"/>
+            </a:schemeClr>
+          </a:solidFill>
+          <a:ln>
+            <a:noFill/>
+          </a:ln>
+        </p:spPr>
+        <p:style>
+          <a:lnRef idx="2">
+            <a:schemeClr val="accent1">
+              <a:shade val="50000"/>
+            </a:schemeClr>
+          </a:lnRef>
+          <a:fillRef idx="1">
+            <a:schemeClr val="accent1"/>
+          </a:fillRef>
+          <a:effectRef idx="0">
+            <a:schemeClr val="accent1"/>
+          </a:effectRef>
+          <a:fontRef idx="minor">
+            <a:schemeClr val="lt1"/>
+          </a:fontRef>
+        </p:style>
+        <p:txBody>
+          <a:bodyPr rtlCol="0" anchor="ctr"/>
+          <a:lstStyle/>
+          <a:p>
+            <a:pPr algn="ctr"/>
+            <a:endParaRPr lang="en-US"/>
+          </a:p>
+        </p:txBody>
+      </p:sp>
+      <p:sp>
+        <p:nvSpPr>
+          <p:cNvPr id="30" name="Preparation 29">
+            <a:extLst>
+              <a:ext uri="{FF2B5EF4-FFF2-40B4-BE49-F238E27FC236}">
+                <a16:creationId xmlns:a16="http://schemas.microsoft.com/office/drawing/2014/main" id="{3A0265A8-C47F-724F-BE3D-C19BFC900F1B}"/>
+              </a:ext>
+            </a:extLst>
+          </p:cNvPr>
+          <p:cNvSpPr/>
+          <p:nvPr/>
+        </p:nvSpPr>
+        <p:spPr>
+          <a:xfrm rot="16200000">
+            <a:off x="748441" y="2261879"/>
+            <a:ext cx="523815" cy="453445"/>
+          </a:xfrm>
+          <a:prstGeom prst="flowChartPreparation">
+            <a:avLst/>
+          </a:prstGeom>
+          <a:solidFill>
+            <a:schemeClr val="accent1">
+              <a:lumMod val="20000"/>
+              <a:lumOff val="80000"/>
+            </a:schemeClr>
+          </a:solidFill>
+          <a:ln>
+            <a:noFill/>
+          </a:ln>
+        </p:spPr>
+        <p:style>
+          <a:lnRef idx="2">
+            <a:schemeClr val="accent1">
+              <a:shade val="50000"/>
+            </a:schemeClr>
+          </a:lnRef>
+          <a:fillRef idx="1">
+            <a:schemeClr val="accent1"/>
+          </a:fillRef>
+          <a:effectRef idx="0">
+            <a:schemeClr val="accent1"/>
+          </a:effectRef>
+          <a:fontRef idx="minor">
+            <a:schemeClr val="lt1"/>
+          </a:fontRef>
+        </p:style>
+        <p:txBody>
+          <a:bodyPr rtlCol="0" anchor="ctr"/>
+          <a:lstStyle/>
+          <a:p>
+            <a:pPr algn="ctr"/>
+            <a:endParaRPr lang="en-US"/>
+          </a:p>
+        </p:txBody>
+      </p:sp>
+      <p:sp>
+        <p:nvSpPr>
+          <p:cNvPr id="43" name="Preparation 42">
+            <a:extLst>
+              <a:ext uri="{FF2B5EF4-FFF2-40B4-BE49-F238E27FC236}">
+                <a16:creationId xmlns:a16="http://schemas.microsoft.com/office/drawing/2014/main" id="{C15F6C17-05F9-884F-9F2E-0CE934A04F1C}"/>
+              </a:ext>
+            </a:extLst>
+          </p:cNvPr>
+          <p:cNvSpPr/>
+          <p:nvPr/>
+        </p:nvSpPr>
+        <p:spPr>
+          <a:xfrm rot="16200000">
+            <a:off x="995890" y="2713748"/>
+            <a:ext cx="513712" cy="453448"/>
+          </a:xfrm>
+          <a:prstGeom prst="flowChartPreparation">
+            <a:avLst/>
+          </a:prstGeom>
+          <a:solidFill>
+            <a:schemeClr val="accent1">
+              <a:lumMod val="60000"/>
+              <a:lumOff val="40000"/>
+            </a:schemeClr>
+          </a:solidFill>
+          <a:ln>
+            <a:noFill/>
+          </a:ln>
+        </p:spPr>
+        <p:style>
+          <a:lnRef idx="2">
+            <a:schemeClr val="accent1">
+              <a:shade val="50000"/>
+            </a:schemeClr>
+          </a:lnRef>
+          <a:fillRef idx="1">
+            <a:schemeClr val="accent1"/>
+          </a:fillRef>
+          <a:effectRef idx="0">
+            <a:schemeClr val="accent1"/>
+          </a:effectRef>
+          <a:fontRef idx="minor">
+            <a:schemeClr val="lt1"/>
+          </a:fontRef>
+        </p:style>
+        <p:txBody>
+          <a:bodyPr rtlCol="0" anchor="ctr"/>
+          <a:lstStyle/>
+          <a:p>
+            <a:pPr algn="ctr"/>
+            <a:endParaRPr lang="en-US"/>
+          </a:p>
+        </p:txBody>
+      </p:sp>
+      <p:sp>
+        <p:nvSpPr>
+          <p:cNvPr id="51" name="Preparation 50">
+            <a:extLst>
+              <a:ext uri="{FF2B5EF4-FFF2-40B4-BE49-F238E27FC236}">
+                <a16:creationId xmlns:a16="http://schemas.microsoft.com/office/drawing/2014/main" id="{BA2EAFA0-761E-4246-942B-BC9109B4F2B2}"/>
+              </a:ext>
+            </a:extLst>
+          </p:cNvPr>
+          <p:cNvSpPr/>
+          <p:nvPr/>
+        </p:nvSpPr>
+        <p:spPr>
+          <a:xfrm rot="16200000">
+            <a:off x="756779" y="3161418"/>
+            <a:ext cx="513712" cy="453448"/>
+          </a:xfrm>
+          <a:prstGeom prst="flowChartPreparation">
+            <a:avLst/>
+          </a:prstGeom>
+          <a:solidFill>
+            <a:schemeClr val="accent1">
+              <a:lumMod val="60000"/>
+              <a:lumOff val="40000"/>
+            </a:schemeClr>
+          </a:solidFill>
+          <a:ln>
+            <a:noFill/>
+          </a:ln>
+        </p:spPr>
+        <p:style>
+          <a:lnRef idx="2">
+            <a:schemeClr val="accent1">
+              <a:shade val="50000"/>
+            </a:schemeClr>
+          </a:lnRef>
+          <a:fillRef idx="1">
+            <a:schemeClr val="accent1"/>
+          </a:fillRef>
+          <a:effectRef idx="0">
+            <a:schemeClr val="accent1"/>
+          </a:effectRef>
+          <a:fontRef idx="minor">
+            <a:schemeClr val="lt1"/>
+          </a:fontRef>
+        </p:style>
+        <p:txBody>
+          <a:bodyPr rtlCol="0" anchor="ctr"/>
+          <a:lstStyle/>
+          <a:p>
+            <a:pPr algn="ctr"/>
+            <a:endParaRPr lang="en-US"/>
+          </a:p>
+        </p:txBody>
+      </p:sp>
+      <p:sp>
+        <p:nvSpPr>
+          <p:cNvPr id="15" name="Preparation 14">
+            <a:extLst>
+              <a:ext uri="{FF2B5EF4-FFF2-40B4-BE49-F238E27FC236}">
+                <a16:creationId xmlns:a16="http://schemas.microsoft.com/office/drawing/2014/main" id="{19616D1E-05F7-084D-A56A-D0B82A2CA949}"/>
+              </a:ext>
+            </a:extLst>
+          </p:cNvPr>
+          <p:cNvSpPr/>
+          <p:nvPr/>
+        </p:nvSpPr>
+        <p:spPr>
+          <a:xfrm rot="16200000">
+            <a:off x="1253893" y="3147652"/>
+            <a:ext cx="513712" cy="453448"/>
+          </a:xfrm>
+          <a:prstGeom prst="flowChartPreparation">
+            <a:avLst/>
+          </a:prstGeom>
+          <a:solidFill>
+            <a:schemeClr val="accent1">
+              <a:lumMod val="60000"/>
+              <a:lumOff val="40000"/>
+            </a:schemeClr>
+          </a:solidFill>
+          <a:ln>
+            <a:noFill/>
+          </a:ln>
+        </p:spPr>
+        <p:style>
+          <a:lnRef idx="2">
+            <a:schemeClr val="accent1">
+              <a:shade val="50000"/>
+            </a:schemeClr>
+          </a:lnRef>
+          <a:fillRef idx="1">
+            <a:schemeClr val="accent1"/>
+          </a:fillRef>
+          <a:effectRef idx="0">
+            <a:schemeClr val="accent1"/>
+          </a:effectRef>
+          <a:fontRef idx="minor">
+            <a:schemeClr val="lt1"/>
+          </a:fontRef>
+        </p:style>
+        <p:txBody>
+          <a:bodyPr rtlCol="0" anchor="ctr"/>
+          <a:lstStyle/>
+          <a:p>
+            <a:pPr algn="ctr"/>
+            <a:endParaRPr lang="en-US"/>
+          </a:p>
+        </p:txBody>
+      </p:sp>
+      <p:sp>
+        <p:nvSpPr>
+          <p:cNvPr id="16" name="Preparation 15">
+            <a:extLst>
+              <a:ext uri="{FF2B5EF4-FFF2-40B4-BE49-F238E27FC236}">
+                <a16:creationId xmlns:a16="http://schemas.microsoft.com/office/drawing/2014/main" id="{34EA36F1-5C4C-924A-9B5E-058B98775297}"/>
+              </a:ext>
+            </a:extLst>
+          </p:cNvPr>
+          <p:cNvSpPr/>
+          <p:nvPr/>
+        </p:nvSpPr>
+        <p:spPr>
+          <a:xfrm rot="16200000">
+            <a:off x="1014782" y="3595322"/>
+            <a:ext cx="513712" cy="453448"/>
+          </a:xfrm>
+          <a:prstGeom prst="flowChartPreparation">
+            <a:avLst/>
+          </a:prstGeom>
+          <a:solidFill>
+            <a:schemeClr val="accent1">
+              <a:lumMod val="60000"/>
+              <a:lumOff val="40000"/>
+            </a:schemeClr>
+          </a:solidFill>
+          <a:ln>
+            <a:solidFill>
+              <a:schemeClr val="tx1"/>
+            </a:solidFill>
+          </a:ln>
+        </p:spPr>
+        <p:style>
+          <a:lnRef idx="2">
+            <a:schemeClr val="accent1">
+              <a:shade val="50000"/>
+            </a:schemeClr>
+          </a:lnRef>
+          <a:fillRef idx="1">
+            <a:schemeClr val="accent1"/>
+          </a:fillRef>
+          <a:effectRef idx="0">
+            <a:schemeClr val="accent1"/>
+          </a:effectRef>
+          <a:fontRef idx="minor">
+            <a:schemeClr val="lt1"/>
+          </a:fontRef>
+        </p:style>
+        <p:txBody>
+          <a:bodyPr rtlCol="0" anchor="ctr"/>
+          <a:lstStyle/>
+          <a:p>
+            <a:pPr algn="ctr"/>
+            <a:endParaRPr lang="en-US"/>
+          </a:p>
+        </p:txBody>
+      </p:sp>
+      <p:sp>
+        <p:nvSpPr>
+          <p:cNvPr id="17" name="Preparation 16">
+            <a:extLst>
+              <a:ext uri="{FF2B5EF4-FFF2-40B4-BE49-F238E27FC236}">
+                <a16:creationId xmlns:a16="http://schemas.microsoft.com/office/drawing/2014/main" id="{BE49A20C-8E3A-4E4C-A457-D232E1912328}"/>
+              </a:ext>
+            </a:extLst>
+          </p:cNvPr>
+          <p:cNvSpPr/>
+          <p:nvPr/>
+        </p:nvSpPr>
+        <p:spPr>
+          <a:xfrm rot="16200000">
+            <a:off x="524831" y="3608238"/>
+            <a:ext cx="513712" cy="453448"/>
+          </a:xfrm>
+          <a:prstGeom prst="flowChartPreparation">
+            <a:avLst/>
+          </a:prstGeom>
+          <a:solidFill>
+            <a:schemeClr val="accent1">
+              <a:lumMod val="60000"/>
+              <a:lumOff val="40000"/>
+            </a:schemeClr>
+          </a:solidFill>
+          <a:ln>
+            <a:solidFill>
+              <a:schemeClr val="tx1"/>
+            </a:solidFill>
+          </a:ln>
+        </p:spPr>
+        <p:style>
+          <a:lnRef idx="2">
+            <a:schemeClr val="accent1">
+              <a:shade val="50000"/>
+            </a:schemeClr>
+          </a:lnRef>
+          <a:fillRef idx="1">
+            <a:schemeClr val="accent1"/>
+          </a:fillRef>
+          <a:effectRef idx="0">
+            <a:schemeClr val="accent1"/>
+          </a:effectRef>
+          <a:fontRef idx="minor">
+            <a:schemeClr val="lt1"/>
+          </a:fontRef>
+        </p:style>
+        <p:txBody>
+          <a:bodyPr rtlCol="0" anchor="ctr"/>
+          <a:lstStyle/>
+          <a:p>
+            <a:pPr algn="ctr"/>
+            <a:endParaRPr lang="en-US"/>
+          </a:p>
+        </p:txBody>
+      </p:sp>
+      <p:sp>
+        <p:nvSpPr>
+          <p:cNvPr id="18" name="Preparation 17">
+            <a:extLst>
+              <a:ext uri="{FF2B5EF4-FFF2-40B4-BE49-F238E27FC236}">
+                <a16:creationId xmlns:a16="http://schemas.microsoft.com/office/drawing/2014/main" id="{DF161DF5-B20A-D341-B02A-C99F7660D5A1}"/>
+              </a:ext>
+            </a:extLst>
+          </p:cNvPr>
+          <p:cNvSpPr/>
+          <p:nvPr/>
+        </p:nvSpPr>
+        <p:spPr>
+          <a:xfrm rot="16200000">
+            <a:off x="285720" y="4055908"/>
+            <a:ext cx="513712" cy="453448"/>
+          </a:xfrm>
+          <a:prstGeom prst="flowChartPreparation">
+            <a:avLst/>
+          </a:prstGeom>
+          <a:solidFill>
+            <a:schemeClr val="accent1">
+              <a:lumMod val="60000"/>
+              <a:lumOff val="40000"/>
+            </a:schemeClr>
+          </a:solidFill>
+          <a:ln>
+            <a:solidFill>
+              <a:schemeClr val="tx1"/>
+            </a:solidFill>
+          </a:ln>
+        </p:spPr>
+        <p:style>
+          <a:lnRef idx="2">
+            <a:schemeClr val="accent1">
+              <a:shade val="50000"/>
+            </a:schemeClr>
+          </a:lnRef>
+          <a:fillRef idx="1">
+            <a:schemeClr val="accent1"/>
+          </a:fillRef>
+          <a:effectRef idx="0">
+            <a:schemeClr val="accent1"/>
+          </a:effectRef>
+          <a:fontRef idx="minor">
+            <a:schemeClr val="lt1"/>
+          </a:fontRef>
+        </p:style>
+        <p:txBody>
+          <a:bodyPr rtlCol="0" anchor="ctr"/>
+          <a:lstStyle/>
+          <a:p>
+            <a:pPr algn="ctr"/>
+            <a:endParaRPr lang="en-US"/>
+          </a:p>
+        </p:txBody>
+      </p:sp>
+      <p:sp>
+        <p:nvSpPr>
+          <p:cNvPr id="19" name="Preparation 18">
+            <a:extLst>
+              <a:ext uri="{FF2B5EF4-FFF2-40B4-BE49-F238E27FC236}">
+                <a16:creationId xmlns:a16="http://schemas.microsoft.com/office/drawing/2014/main" id="{959E83E6-37C9-D245-A93B-7815007D4D43}"/>
+              </a:ext>
+            </a:extLst>
+          </p:cNvPr>
+          <p:cNvSpPr/>
+          <p:nvPr/>
+        </p:nvSpPr>
+        <p:spPr>
+          <a:xfrm rot="16200000">
+            <a:off x="1519058" y="3594472"/>
+            <a:ext cx="513712" cy="453448"/>
+          </a:xfrm>
+          <a:prstGeom prst="flowChartPreparation">
+            <a:avLst/>
+          </a:prstGeom>
+          <a:solidFill>
+            <a:schemeClr val="accent1">
+              <a:lumMod val="60000"/>
+              <a:lumOff val="40000"/>
+            </a:schemeClr>
+          </a:solidFill>
+          <a:ln>
+            <a:solidFill>
+              <a:schemeClr val="tx1"/>
+            </a:solidFill>
+          </a:ln>
+        </p:spPr>
+        <p:style>
+          <a:lnRef idx="2">
+            <a:schemeClr val="accent1">
+              <a:shade val="50000"/>
+            </a:schemeClr>
+          </a:lnRef>
+          <a:fillRef idx="1">
+            <a:schemeClr val="accent1"/>
+          </a:fillRef>
+          <a:effectRef idx="0">
+            <a:schemeClr val="accent1"/>
+          </a:effectRef>
+          <a:fontRef idx="minor">
+            <a:schemeClr val="lt1"/>
+          </a:fontRef>
+        </p:style>
+        <p:txBody>
+          <a:bodyPr rtlCol="0" anchor="ctr"/>
+          <a:lstStyle/>
+          <a:p>
+            <a:pPr algn="ctr"/>
+            <a:endParaRPr lang="en-US"/>
+          </a:p>
+        </p:txBody>
+      </p:sp>
+      <p:sp>
+        <p:nvSpPr>
+          <p:cNvPr id="20" name="Preparation 19">
+            <a:extLst>
+              <a:ext uri="{FF2B5EF4-FFF2-40B4-BE49-F238E27FC236}">
+                <a16:creationId xmlns:a16="http://schemas.microsoft.com/office/drawing/2014/main" id="{9CAB8B78-6CB0-EE45-916A-B65D0BFD61EB}"/>
+              </a:ext>
+            </a:extLst>
+          </p:cNvPr>
+          <p:cNvSpPr/>
+          <p:nvPr/>
+        </p:nvSpPr>
+        <p:spPr>
+          <a:xfrm rot="16200000">
+            <a:off x="1279947" y="4042142"/>
+            <a:ext cx="513712" cy="453448"/>
+          </a:xfrm>
+          <a:prstGeom prst="flowChartPreparation">
+            <a:avLst/>
+          </a:prstGeom>
+          <a:solidFill>
+            <a:schemeClr val="accent1">
+              <a:lumMod val="60000"/>
+              <a:lumOff val="40000"/>
+            </a:schemeClr>
+          </a:solidFill>
+          <a:ln>
+            <a:solidFill>
+              <a:schemeClr val="tx1"/>
+            </a:solidFill>
+          </a:ln>
+        </p:spPr>
+        <p:style>
+          <a:lnRef idx="2">
+            <a:schemeClr val="accent1">
+              <a:shade val="50000"/>
+            </a:schemeClr>
+          </a:lnRef>
+          <a:fillRef idx="1">
+            <a:schemeClr val="accent1"/>
+          </a:fillRef>
+          <a:effectRef idx="0">
+            <a:schemeClr val="accent1"/>
+          </a:effectRef>
+          <a:fontRef idx="minor">
+            <a:schemeClr val="lt1"/>
+          </a:fontRef>
+        </p:style>
+        <p:txBody>
+          <a:bodyPr rtlCol="0" anchor="ctr"/>
+          <a:lstStyle/>
+          <a:p>
+            <a:pPr algn="ctr"/>
+            <a:endParaRPr lang="en-US"/>
+          </a:p>
+        </p:txBody>
+      </p:sp>
+      <p:sp>
+        <p:nvSpPr>
+          <p:cNvPr id="21" name="Preparation 20">
+            <a:extLst>
+              <a:ext uri="{FF2B5EF4-FFF2-40B4-BE49-F238E27FC236}">
+                <a16:creationId xmlns:a16="http://schemas.microsoft.com/office/drawing/2014/main" id="{D20DD3A5-5165-DF48-AF1D-8AE756A2A577}"/>
+              </a:ext>
+            </a:extLst>
+          </p:cNvPr>
+          <p:cNvSpPr/>
+          <p:nvPr/>
+        </p:nvSpPr>
+        <p:spPr>
+          <a:xfrm rot="16200000">
+            <a:off x="789996" y="4055058"/>
+            <a:ext cx="513712" cy="453448"/>
+          </a:xfrm>
+          <a:prstGeom prst="flowChartPreparation">
+            <a:avLst/>
+          </a:prstGeom>
+          <a:solidFill>
+            <a:schemeClr val="accent1">
+              <a:lumMod val="60000"/>
+              <a:lumOff val="40000"/>
+            </a:schemeClr>
+          </a:solidFill>
+          <a:ln>
+            <a:solidFill>
+              <a:schemeClr val="tx1"/>
+            </a:solidFill>
+          </a:ln>
+        </p:spPr>
+        <p:style>
+          <a:lnRef idx="2">
+            <a:schemeClr val="accent1">
+              <a:shade val="50000"/>
+            </a:schemeClr>
+          </a:lnRef>
+          <a:fillRef idx="1">
+            <a:schemeClr val="accent1"/>
+          </a:fillRef>
+          <a:effectRef idx="0">
+            <a:schemeClr val="accent1"/>
+          </a:effectRef>
+          <a:fontRef idx="minor">
+            <a:schemeClr val="lt1"/>
+          </a:fontRef>
+        </p:style>
+        <p:txBody>
+          <a:bodyPr rtlCol="0" anchor="ctr"/>
+          <a:lstStyle/>
+          <a:p>
+            <a:pPr algn="ctr"/>
+            <a:endParaRPr lang="en-US"/>
+          </a:p>
+        </p:txBody>
+      </p:sp>
+      <p:sp>
+        <p:nvSpPr>
+          <p:cNvPr id="23" name="Preparation 22">
+            <a:extLst>
+              <a:ext uri="{FF2B5EF4-FFF2-40B4-BE49-F238E27FC236}">
+                <a16:creationId xmlns:a16="http://schemas.microsoft.com/office/drawing/2014/main" id="{0211C28A-23D7-0A48-B916-840BC10FD594}"/>
+              </a:ext>
+            </a:extLst>
+          </p:cNvPr>
+          <p:cNvSpPr/>
+          <p:nvPr/>
+        </p:nvSpPr>
+        <p:spPr>
+          <a:xfrm rot="16200000">
+            <a:off x="2019459" y="3595322"/>
+            <a:ext cx="513712" cy="453448"/>
+          </a:xfrm>
+          <a:prstGeom prst="flowChartPreparation">
+            <a:avLst/>
+          </a:prstGeom>
+          <a:solidFill>
+            <a:schemeClr val="accent1">
+              <a:lumMod val="75000"/>
+            </a:schemeClr>
+          </a:solidFill>
+          <a:ln>
+            <a:solidFill>
+              <a:schemeClr val="tx1"/>
+            </a:solidFill>
+          </a:ln>
+        </p:spPr>
+        <p:style>
+          <a:lnRef idx="2">
+            <a:schemeClr val="accent1">
+              <a:shade val="50000"/>
+            </a:schemeClr>
+          </a:lnRef>
+          <a:fillRef idx="1">
+            <a:schemeClr val="accent1"/>
+          </a:fillRef>
+          <a:effectRef idx="0">
+            <a:schemeClr val="accent1"/>
+          </a:effectRef>
+          <a:fontRef idx="minor">
+            <a:schemeClr val="lt1"/>
+          </a:fontRef>
+        </p:style>
+        <p:txBody>
+          <a:bodyPr rtlCol="0" anchor="ctr"/>
+          <a:lstStyle/>
+          <a:p>
+            <a:pPr algn="ctr"/>
+            <a:endParaRPr lang="en-US"/>
+          </a:p>
+        </p:txBody>
+      </p:sp>
+      <p:sp>
+        <p:nvSpPr>
+          <p:cNvPr id="24" name="Preparation 23">
+            <a:extLst>
+              <a:ext uri="{FF2B5EF4-FFF2-40B4-BE49-F238E27FC236}">
+                <a16:creationId xmlns:a16="http://schemas.microsoft.com/office/drawing/2014/main" id="{AEA200C8-4AC3-E94D-857E-D1ECA14966A4}"/>
+              </a:ext>
+            </a:extLst>
+          </p:cNvPr>
+          <p:cNvSpPr/>
+          <p:nvPr/>
+        </p:nvSpPr>
+        <p:spPr>
+          <a:xfrm rot="16200000">
+            <a:off x="1780348" y="4042992"/>
+            <a:ext cx="513712" cy="453448"/>
+          </a:xfrm>
+          <a:prstGeom prst="flowChartPreparation">
+            <a:avLst/>
+          </a:prstGeom>
+          <a:solidFill>
+            <a:schemeClr val="accent1">
+              <a:lumMod val="60000"/>
+              <a:lumOff val="40000"/>
+            </a:schemeClr>
+          </a:solidFill>
+          <a:ln>
+            <a:solidFill>
+              <a:schemeClr val="tx1"/>
+            </a:solidFill>
+          </a:ln>
+        </p:spPr>
+        <p:style>
+          <a:lnRef idx="2">
+            <a:schemeClr val="accent1">
+              <a:shade val="50000"/>
+            </a:schemeClr>
+          </a:lnRef>
+          <a:fillRef idx="1">
+            <a:schemeClr val="accent1"/>
+          </a:fillRef>
+          <a:effectRef idx="0">
+            <a:schemeClr val="accent1"/>
+          </a:effectRef>
+          <a:fontRef idx="minor">
+            <a:schemeClr val="lt1"/>
+          </a:fontRef>
+        </p:style>
+        <p:txBody>
+          <a:bodyPr rtlCol="0" anchor="ctr"/>
+          <a:lstStyle/>
+          <a:p>
+            <a:pPr algn="ctr"/>
+            <a:endParaRPr lang="en-US"/>
+          </a:p>
+        </p:txBody>
+      </p:sp>
+      <p:sp>
+        <p:nvSpPr>
+          <p:cNvPr id="25" name="Preparation 24">
+            <a:extLst>
+              <a:ext uri="{FF2B5EF4-FFF2-40B4-BE49-F238E27FC236}">
+                <a16:creationId xmlns:a16="http://schemas.microsoft.com/office/drawing/2014/main" id="{58DC28EE-6BBF-1D40-878C-51F3B4CF842A}"/>
+              </a:ext>
+            </a:extLst>
+          </p:cNvPr>
+          <p:cNvSpPr/>
+          <p:nvPr/>
+        </p:nvSpPr>
+        <p:spPr>
+          <a:xfrm rot="16200000">
+            <a:off x="2284624" y="4042142"/>
+            <a:ext cx="513712" cy="453448"/>
+          </a:xfrm>
+          <a:prstGeom prst="flowChartPreparation">
+            <a:avLst/>
+          </a:prstGeom>
+          <a:solidFill>
+            <a:schemeClr val="accent1">
+              <a:lumMod val="75000"/>
+            </a:schemeClr>
+          </a:solidFill>
+          <a:ln>
+            <a:solidFill>
+              <a:schemeClr val="tx1"/>
+            </a:solidFill>
+          </a:ln>
+        </p:spPr>
+        <p:style>
+          <a:lnRef idx="2">
+            <a:schemeClr val="accent1">
+              <a:shade val="50000"/>
+            </a:schemeClr>
+          </a:lnRef>
+          <a:fillRef idx="1">
+            <a:schemeClr val="accent1"/>
+          </a:fillRef>
+          <a:effectRef idx="0">
+            <a:schemeClr val="accent1"/>
+          </a:effectRef>
+          <a:fontRef idx="minor">
+            <a:schemeClr val="lt1"/>
+          </a:fontRef>
+        </p:style>
+        <p:txBody>
+          <a:bodyPr rtlCol="0" anchor="ctr"/>
+          <a:lstStyle/>
+          <a:p>
+            <a:pPr algn="ctr"/>
+            <a:endParaRPr lang="en-US"/>
+          </a:p>
+        </p:txBody>
+      </p:sp>
+      <p:sp>
+        <p:nvSpPr>
+          <p:cNvPr id="26" name="Preparation 25">
+            <a:extLst>
+              <a:ext uri="{FF2B5EF4-FFF2-40B4-BE49-F238E27FC236}">
+                <a16:creationId xmlns:a16="http://schemas.microsoft.com/office/drawing/2014/main" id="{77668637-1618-3147-80CB-B211F87A6A96}"/>
+              </a:ext>
+            </a:extLst>
+          </p:cNvPr>
+          <p:cNvSpPr/>
+          <p:nvPr/>
+        </p:nvSpPr>
+        <p:spPr>
+          <a:xfrm rot="16200000">
+            <a:off x="2045513" y="4489812"/>
+            <a:ext cx="513712" cy="453448"/>
+          </a:xfrm>
+          <a:prstGeom prst="flowChartPreparation">
+            <a:avLst/>
+          </a:prstGeom>
+          <a:solidFill>
+            <a:schemeClr val="accent1">
+              <a:lumMod val="75000"/>
+            </a:schemeClr>
+          </a:solidFill>
+          <a:ln>
+            <a:solidFill>
+              <a:schemeClr val="tx1"/>
+            </a:solidFill>
+          </a:ln>
+        </p:spPr>
+        <p:style>
+          <a:lnRef idx="2">
+            <a:schemeClr val="accent1">
+              <a:shade val="50000"/>
+            </a:schemeClr>
+          </a:lnRef>
+          <a:fillRef idx="1">
+            <a:schemeClr val="accent1"/>
+          </a:fillRef>
+          <a:effectRef idx="0">
+            <a:schemeClr val="accent1"/>
+          </a:effectRef>
+          <a:fontRef idx="minor">
+            <a:schemeClr val="lt1"/>
+          </a:fontRef>
+        </p:style>
+        <p:txBody>
+          <a:bodyPr rtlCol="0" anchor="ctr"/>
+          <a:lstStyle/>
+          <a:p>
+            <a:pPr algn="ctr"/>
+            <a:endParaRPr lang="en-US"/>
+          </a:p>
+        </p:txBody>
+      </p:sp>
+      <p:sp>
+        <p:nvSpPr>
+          <p:cNvPr id="27" name="Preparation 26">
+            <a:extLst>
+              <a:ext uri="{FF2B5EF4-FFF2-40B4-BE49-F238E27FC236}">
+                <a16:creationId xmlns:a16="http://schemas.microsoft.com/office/drawing/2014/main" id="{2A80FB40-D806-6249-9346-205BA92A24EC}"/>
+              </a:ext>
+            </a:extLst>
+          </p:cNvPr>
+          <p:cNvSpPr/>
+          <p:nvPr/>
+        </p:nvSpPr>
+        <p:spPr>
+          <a:xfrm rot="16200000">
+            <a:off x="2777230" y="4044666"/>
+            <a:ext cx="513712" cy="453448"/>
+          </a:xfrm>
+          <a:prstGeom prst="flowChartPreparation">
+            <a:avLst/>
+          </a:prstGeom>
+          <a:solidFill>
+            <a:schemeClr val="accent1">
+              <a:lumMod val="75000"/>
+            </a:schemeClr>
+          </a:solidFill>
+          <a:ln>
+            <a:solidFill>
+              <a:schemeClr val="tx1"/>
+            </a:solidFill>
+          </a:ln>
+        </p:spPr>
+        <p:style>
+          <a:lnRef idx="2">
+            <a:schemeClr val="accent1">
+              <a:shade val="50000"/>
+            </a:schemeClr>
+          </a:lnRef>
+          <a:fillRef idx="1">
+            <a:schemeClr val="accent1"/>
+          </a:fillRef>
+          <a:effectRef idx="0">
+            <a:schemeClr val="accent1"/>
+          </a:effectRef>
+          <a:fontRef idx="minor">
+            <a:schemeClr val="lt1"/>
+          </a:fontRef>
+        </p:style>
+        <p:txBody>
+          <a:bodyPr rtlCol="0" anchor="ctr"/>
+          <a:lstStyle/>
+          <a:p>
+            <a:pPr algn="ctr"/>
+            <a:endParaRPr lang="en-US"/>
+          </a:p>
+        </p:txBody>
+      </p:sp>
+      <p:sp>
+        <p:nvSpPr>
+          <p:cNvPr id="31" name="Preparation 30">
+            <a:extLst>
+              <a:ext uri="{FF2B5EF4-FFF2-40B4-BE49-F238E27FC236}">
+                <a16:creationId xmlns:a16="http://schemas.microsoft.com/office/drawing/2014/main" id="{60A0DABC-8ADE-6F47-A7A0-F00A12455EF3}"/>
+              </a:ext>
+            </a:extLst>
+          </p:cNvPr>
+          <p:cNvSpPr/>
+          <p:nvPr/>
+        </p:nvSpPr>
+        <p:spPr>
+          <a:xfrm rot="16200000">
+            <a:off x="2538119" y="4492336"/>
+            <a:ext cx="513712" cy="453448"/>
+          </a:xfrm>
+          <a:prstGeom prst="flowChartPreparation">
+            <a:avLst/>
+          </a:prstGeom>
+          <a:solidFill>
+            <a:schemeClr val="accent1">
+              <a:lumMod val="75000"/>
+            </a:schemeClr>
+          </a:solidFill>
+          <a:ln>
+            <a:solidFill>
+              <a:schemeClr val="tx1"/>
+            </a:solidFill>
+          </a:ln>
+        </p:spPr>
+        <p:style>
+          <a:lnRef idx="2">
+            <a:schemeClr val="accent1">
+              <a:shade val="50000"/>
+            </a:schemeClr>
+          </a:lnRef>
+          <a:fillRef idx="1">
+            <a:schemeClr val="accent1"/>
+          </a:fillRef>
+          <a:effectRef idx="0">
+            <a:schemeClr val="accent1"/>
+          </a:effectRef>
+          <a:fontRef idx="minor">
+            <a:schemeClr val="lt1"/>
+          </a:fontRef>
+        </p:style>
+        <p:txBody>
+          <a:bodyPr rtlCol="0" anchor="ctr"/>
+          <a:lstStyle/>
+          <a:p>
+            <a:pPr algn="ctr"/>
+            <a:endParaRPr lang="en-US"/>
+          </a:p>
+        </p:txBody>
+      </p:sp>
+      <p:sp>
+        <p:nvSpPr>
+          <p:cNvPr id="32" name="Preparation 31">
+            <a:extLst>
+              <a:ext uri="{FF2B5EF4-FFF2-40B4-BE49-F238E27FC236}">
+                <a16:creationId xmlns:a16="http://schemas.microsoft.com/office/drawing/2014/main" id="{97483DBF-C636-5D4A-8285-7B60E0E9C059}"/>
+              </a:ext>
+            </a:extLst>
+          </p:cNvPr>
+          <p:cNvSpPr/>
+          <p:nvPr/>
+        </p:nvSpPr>
+        <p:spPr>
+          <a:xfrm rot="16200000">
+            <a:off x="3042395" y="4491486"/>
+            <a:ext cx="513712" cy="453448"/>
+          </a:xfrm>
+          <a:prstGeom prst="flowChartPreparation">
+            <a:avLst/>
+          </a:prstGeom>
+          <a:solidFill>
+            <a:schemeClr val="accent1">
+              <a:lumMod val="75000"/>
+            </a:schemeClr>
+          </a:solidFill>
+          <a:ln>
+            <a:solidFill>
+              <a:schemeClr val="tx1"/>
+            </a:solidFill>
+          </a:ln>
+        </p:spPr>
+        <p:style>
+          <a:lnRef idx="2">
+            <a:schemeClr val="accent1">
+              <a:shade val="50000"/>
+            </a:schemeClr>
+          </a:lnRef>
+          <a:fillRef idx="1">
+            <a:schemeClr val="accent1"/>
+          </a:fillRef>
+          <a:effectRef idx="0">
+            <a:schemeClr val="accent1"/>
+          </a:effectRef>
+          <a:fontRef idx="minor">
+            <a:schemeClr val="lt1"/>
+          </a:fontRef>
+        </p:style>
+        <p:txBody>
+          <a:bodyPr rtlCol="0" anchor="ctr"/>
+          <a:lstStyle/>
+          <a:p>
+            <a:pPr algn="ctr"/>
+            <a:endParaRPr lang="en-US"/>
+          </a:p>
+        </p:txBody>
+      </p:sp>
+      <p:sp>
+        <p:nvSpPr>
+          <p:cNvPr id="34" name="Preparation 33">
+            <a:extLst>
+              <a:ext uri="{FF2B5EF4-FFF2-40B4-BE49-F238E27FC236}">
+                <a16:creationId xmlns:a16="http://schemas.microsoft.com/office/drawing/2014/main" id="{BCDFB519-AE29-E449-87B2-801E4AFC7C88}"/>
+              </a:ext>
+            </a:extLst>
+          </p:cNvPr>
+          <p:cNvSpPr/>
+          <p:nvPr/>
+        </p:nvSpPr>
+        <p:spPr>
+          <a:xfrm rot="16200000">
+            <a:off x="987121" y="1820439"/>
+            <a:ext cx="523815" cy="453445"/>
+          </a:xfrm>
+          <a:prstGeom prst="flowChartPreparation">
+            <a:avLst/>
+          </a:prstGeom>
+          <a:solidFill>
+            <a:schemeClr val="accent1">
+              <a:lumMod val="20000"/>
+              <a:lumOff val="80000"/>
+            </a:schemeClr>
+          </a:solidFill>
+          <a:ln>
+            <a:noFill/>
+          </a:ln>
+        </p:spPr>
+        <p:style>
+          <a:lnRef idx="2">
+            <a:schemeClr val="accent1">
+              <a:shade val="50000"/>
+            </a:schemeClr>
+          </a:lnRef>
+          <a:fillRef idx="1">
+            <a:schemeClr val="accent1"/>
+          </a:fillRef>
+          <a:effectRef idx="0">
+            <a:schemeClr val="accent1"/>
+          </a:effectRef>
+          <a:fontRef idx="minor">
+            <a:schemeClr val="lt1"/>
+          </a:fontRef>
+        </p:style>
+        <p:txBody>
+          <a:bodyPr rtlCol="0" anchor="ctr"/>
+          <a:lstStyle/>
+          <a:p>
+            <a:pPr algn="ctr"/>
+            <a:endParaRPr lang="en-US"/>
+          </a:p>
+        </p:txBody>
+      </p:sp>
+      <p:sp>
+        <p:nvSpPr>
+          <p:cNvPr id="35" name="Preparation 34">
+            <a:extLst>
+              <a:ext uri="{FF2B5EF4-FFF2-40B4-BE49-F238E27FC236}">
+                <a16:creationId xmlns:a16="http://schemas.microsoft.com/office/drawing/2014/main" id="{CA973349-A266-4344-825F-FA0E30343C61}"/>
+              </a:ext>
+            </a:extLst>
+          </p:cNvPr>
+          <p:cNvSpPr/>
+          <p:nvPr/>
+        </p:nvSpPr>
+        <p:spPr>
+          <a:xfrm rot="16200000">
+            <a:off x="1233394" y="1368395"/>
+            <a:ext cx="523815" cy="453445"/>
+          </a:xfrm>
+          <a:prstGeom prst="flowChartPreparation">
+            <a:avLst/>
+          </a:prstGeom>
+          <a:solidFill>
+            <a:schemeClr val="accent1">
+              <a:lumMod val="20000"/>
+              <a:lumOff val="80000"/>
+            </a:schemeClr>
+          </a:solidFill>
+          <a:ln>
+            <a:noFill/>
+          </a:ln>
+        </p:spPr>
+        <p:style>
+          <a:lnRef idx="2">
+            <a:schemeClr val="accent1">
+              <a:shade val="50000"/>
+            </a:schemeClr>
+          </a:lnRef>
+          <a:fillRef idx="1">
+            <a:schemeClr val="accent1"/>
+          </a:fillRef>
+          <a:effectRef idx="0">
+            <a:schemeClr val="accent1"/>
+          </a:effectRef>
+          <a:fontRef idx="minor">
+            <a:schemeClr val="lt1"/>
+          </a:fontRef>
+        </p:style>
+        <p:txBody>
+          <a:bodyPr rtlCol="0" anchor="ctr"/>
+          <a:lstStyle/>
+          <a:p>
+            <a:pPr algn="ctr"/>
+            <a:endParaRPr lang="en-US"/>
+          </a:p>
+        </p:txBody>
+      </p:sp>
+      <p:sp>
+        <p:nvSpPr>
+          <p:cNvPr id="36" name="Preparation 35">
+            <a:extLst>
+              <a:ext uri="{FF2B5EF4-FFF2-40B4-BE49-F238E27FC236}">
+                <a16:creationId xmlns:a16="http://schemas.microsoft.com/office/drawing/2014/main" id="{75BD5379-213C-B444-BA85-58A0B91A94B1}"/>
+              </a:ext>
+            </a:extLst>
+          </p:cNvPr>
+          <p:cNvSpPr/>
+          <p:nvPr/>
+        </p:nvSpPr>
+        <p:spPr>
+          <a:xfrm rot="16200000">
+            <a:off x="1241732" y="2267934"/>
+            <a:ext cx="513712" cy="453448"/>
+          </a:xfrm>
+          <a:prstGeom prst="flowChartPreparation">
+            <a:avLst/>
+          </a:prstGeom>
+          <a:solidFill>
+            <a:schemeClr val="accent1">
+              <a:lumMod val="60000"/>
+              <a:lumOff val="40000"/>
+            </a:schemeClr>
+          </a:solidFill>
+          <a:ln>
+            <a:noFill/>
+          </a:ln>
+        </p:spPr>
+        <p:style>
+          <a:lnRef idx="2">
+            <a:schemeClr val="accent1">
+              <a:shade val="50000"/>
+            </a:schemeClr>
+          </a:lnRef>
+          <a:fillRef idx="1">
+            <a:schemeClr val="accent1"/>
+          </a:fillRef>
+          <a:effectRef idx="0">
+            <a:schemeClr val="accent1"/>
+          </a:effectRef>
+          <a:fontRef idx="minor">
+            <a:schemeClr val="lt1"/>
+          </a:fontRef>
+        </p:style>
+        <p:txBody>
+          <a:bodyPr rtlCol="0" anchor="ctr"/>
+          <a:lstStyle/>
+          <a:p>
+            <a:pPr algn="ctr"/>
+            <a:endParaRPr lang="en-US"/>
+          </a:p>
+        </p:txBody>
+      </p:sp>
+      <p:sp>
+        <p:nvSpPr>
+          <p:cNvPr id="37" name="Preparation 36">
+            <a:extLst>
+              <a:ext uri="{FF2B5EF4-FFF2-40B4-BE49-F238E27FC236}">
+                <a16:creationId xmlns:a16="http://schemas.microsoft.com/office/drawing/2014/main" id="{11DE2066-EDEA-C64D-B553-1ECC19BDE59A}"/>
+              </a:ext>
+            </a:extLst>
+          </p:cNvPr>
+          <p:cNvSpPr/>
+          <p:nvPr/>
+        </p:nvSpPr>
+        <p:spPr>
+          <a:xfrm rot="16200000">
+            <a:off x="243937" y="2261124"/>
+            <a:ext cx="523815" cy="453445"/>
+          </a:xfrm>
+          <a:prstGeom prst="flowChartPreparation">
+            <a:avLst/>
+          </a:prstGeom>
+          <a:solidFill>
+            <a:schemeClr val="accent1">
+              <a:lumMod val="20000"/>
+              <a:lumOff val="80000"/>
+            </a:schemeClr>
+          </a:solidFill>
+          <a:ln>
+            <a:noFill/>
+          </a:ln>
+        </p:spPr>
+        <p:style>
+          <a:lnRef idx="2">
+            <a:schemeClr val="accent1">
+              <a:shade val="50000"/>
+            </a:schemeClr>
+          </a:lnRef>
+          <a:fillRef idx="1">
+            <a:schemeClr val="accent1"/>
+          </a:fillRef>
+          <a:effectRef idx="0">
+            <a:schemeClr val="accent1"/>
+          </a:effectRef>
+          <a:fontRef idx="minor">
+            <a:schemeClr val="lt1"/>
+          </a:fontRef>
+        </p:style>
+        <p:txBody>
+          <a:bodyPr rtlCol="0" anchor="ctr"/>
+          <a:lstStyle/>
+          <a:p>
+            <a:pPr algn="ctr"/>
+            <a:endParaRPr lang="en-US"/>
+          </a:p>
+        </p:txBody>
+      </p:sp>
+      <p:sp>
+        <p:nvSpPr>
+          <p:cNvPr id="38" name="Preparation 37">
+            <a:extLst>
+              <a:ext uri="{FF2B5EF4-FFF2-40B4-BE49-F238E27FC236}">
+                <a16:creationId xmlns:a16="http://schemas.microsoft.com/office/drawing/2014/main" id="{E91C4BC6-8EFD-2647-B0C5-148D22FFFC38}"/>
+              </a:ext>
+            </a:extLst>
+          </p:cNvPr>
+          <p:cNvSpPr/>
+          <p:nvPr/>
+        </p:nvSpPr>
+        <p:spPr>
+          <a:xfrm rot="16200000">
+            <a:off x="490210" y="1809080"/>
+            <a:ext cx="523815" cy="453445"/>
+          </a:xfrm>
+          <a:prstGeom prst="flowChartPreparation">
+            <a:avLst/>
+          </a:prstGeom>
+          <a:solidFill>
+            <a:schemeClr val="accent1">
+              <a:lumMod val="20000"/>
+              <a:lumOff val="80000"/>
+            </a:schemeClr>
+          </a:solidFill>
+          <a:ln>
+            <a:noFill/>
+          </a:ln>
+        </p:spPr>
+        <p:style>
+          <a:lnRef idx="2">
+            <a:schemeClr val="accent1">
+              <a:shade val="50000"/>
+            </a:schemeClr>
+          </a:lnRef>
+          <a:fillRef idx="1">
+            <a:schemeClr val="accent1"/>
+          </a:fillRef>
+          <a:effectRef idx="0">
+            <a:schemeClr val="accent1"/>
+          </a:effectRef>
+          <a:fontRef idx="minor">
+            <a:schemeClr val="lt1"/>
+          </a:fontRef>
+        </p:style>
+        <p:txBody>
+          <a:bodyPr rtlCol="0" anchor="ctr"/>
+          <a:lstStyle/>
+          <a:p>
+            <a:pPr algn="ctr"/>
+            <a:endParaRPr lang="en-US"/>
+          </a:p>
+        </p:txBody>
+      </p:sp>
+      <p:sp>
+        <p:nvSpPr>
+          <p:cNvPr id="40" name="Preparation 39">
+            <a:extLst>
+              <a:ext uri="{FF2B5EF4-FFF2-40B4-BE49-F238E27FC236}">
+                <a16:creationId xmlns:a16="http://schemas.microsoft.com/office/drawing/2014/main" id="{4BE7E9C6-B653-3A49-B3F0-2DEE95485F43}"/>
+              </a:ext>
+            </a:extLst>
+          </p:cNvPr>
+          <p:cNvSpPr/>
+          <p:nvPr/>
+        </p:nvSpPr>
+        <p:spPr>
+          <a:xfrm rot="16200000">
+            <a:off x="728890" y="1367640"/>
+            <a:ext cx="523815" cy="453445"/>
+          </a:xfrm>
+          <a:prstGeom prst="flowChartPreparation">
+            <a:avLst/>
+          </a:prstGeom>
+          <a:solidFill>
+            <a:schemeClr val="accent1">
+              <a:lumMod val="20000"/>
+              <a:lumOff val="80000"/>
+            </a:schemeClr>
+          </a:solidFill>
+          <a:ln>
+            <a:noFill/>
+          </a:ln>
+        </p:spPr>
+        <p:style>
+          <a:lnRef idx="2">
+            <a:schemeClr val="accent1">
+              <a:shade val="50000"/>
+            </a:schemeClr>
+          </a:lnRef>
+          <a:fillRef idx="1">
+            <a:schemeClr val="accent1"/>
+          </a:fillRef>
+          <a:effectRef idx="0">
+            <a:schemeClr val="accent1"/>
+          </a:effectRef>
+          <a:fontRef idx="minor">
+            <a:schemeClr val="lt1"/>
+          </a:fontRef>
+        </p:style>
+        <p:txBody>
+          <a:bodyPr rtlCol="0" anchor="ctr"/>
+          <a:lstStyle/>
+          <a:p>
+            <a:pPr algn="ctr"/>
+            <a:endParaRPr lang="en-US"/>
+          </a:p>
+        </p:txBody>
+      </p:sp>
+      <p:sp>
+        <p:nvSpPr>
+          <p:cNvPr id="41" name="Preparation 40">
+            <a:extLst>
+              <a:ext uri="{FF2B5EF4-FFF2-40B4-BE49-F238E27FC236}">
+                <a16:creationId xmlns:a16="http://schemas.microsoft.com/office/drawing/2014/main" id="{6E5BF486-33A3-134A-913A-191B229F7838}"/>
+              </a:ext>
+            </a:extLst>
+          </p:cNvPr>
+          <p:cNvSpPr/>
+          <p:nvPr/>
+        </p:nvSpPr>
+        <p:spPr>
+          <a:xfrm rot="16200000">
+            <a:off x="975163" y="915596"/>
+            <a:ext cx="523815" cy="453445"/>
+          </a:xfrm>
+          <a:prstGeom prst="flowChartPreparation">
+            <a:avLst/>
+          </a:prstGeom>
+          <a:solidFill>
+            <a:schemeClr val="accent1">
+              <a:lumMod val="20000"/>
+              <a:lumOff val="80000"/>
+            </a:schemeClr>
+          </a:solidFill>
+          <a:ln>
+            <a:noFill/>
+          </a:ln>
+        </p:spPr>
+        <p:style>
+          <a:lnRef idx="2">
+            <a:schemeClr val="accent1">
+              <a:shade val="50000"/>
+            </a:schemeClr>
+          </a:lnRef>
+          <a:fillRef idx="1">
+            <a:schemeClr val="accent1"/>
+          </a:fillRef>
+          <a:effectRef idx="0">
+            <a:schemeClr val="accent1"/>
+          </a:effectRef>
+          <a:fontRef idx="minor">
+            <a:schemeClr val="lt1"/>
+          </a:fontRef>
+        </p:style>
+        <p:txBody>
+          <a:bodyPr rtlCol="0" anchor="ctr"/>
+          <a:lstStyle/>
+          <a:p>
+            <a:pPr algn="ctr"/>
+            <a:endParaRPr lang="en-US"/>
+          </a:p>
+        </p:txBody>
+      </p:sp>
+      <p:sp>
+        <p:nvSpPr>
+          <p:cNvPr id="49" name="Preparation 48">
+            <a:extLst>
+              <a:ext uri="{FF2B5EF4-FFF2-40B4-BE49-F238E27FC236}">
+                <a16:creationId xmlns:a16="http://schemas.microsoft.com/office/drawing/2014/main" id="{CA9871E5-015D-1746-A719-B40B8BE74C12}"/>
+              </a:ext>
+            </a:extLst>
+          </p:cNvPr>
+          <p:cNvSpPr/>
+          <p:nvPr/>
+        </p:nvSpPr>
+        <p:spPr>
+          <a:xfrm rot="16200000">
+            <a:off x="1976928" y="915595"/>
+            <a:ext cx="523815" cy="453445"/>
+          </a:xfrm>
+          <a:prstGeom prst="flowChartPreparation">
+            <a:avLst/>
+          </a:prstGeom>
+          <a:solidFill>
+            <a:schemeClr val="accent1">
+              <a:lumMod val="20000"/>
+              <a:lumOff val="80000"/>
+            </a:schemeClr>
+          </a:solidFill>
+          <a:ln>
+            <a:noFill/>
+          </a:ln>
+        </p:spPr>
+        <p:style>
+          <a:lnRef idx="2">
+            <a:schemeClr val="accent1">
+              <a:shade val="50000"/>
+            </a:schemeClr>
+          </a:lnRef>
+          <a:fillRef idx="1">
+            <a:schemeClr val="accent1"/>
+          </a:fillRef>
+          <a:effectRef idx="0">
+            <a:schemeClr val="accent1"/>
+          </a:effectRef>
+          <a:fontRef idx="minor">
+            <a:schemeClr val="lt1"/>
+          </a:fontRef>
+        </p:style>
+        <p:txBody>
+          <a:bodyPr rtlCol="0" anchor="ctr"/>
+          <a:lstStyle/>
+          <a:p>
+            <a:pPr algn="ctr"/>
+            <a:endParaRPr lang="en-US"/>
+          </a:p>
+        </p:txBody>
+      </p:sp>
+      <p:sp>
+        <p:nvSpPr>
+          <p:cNvPr id="53" name="Preparation 52">
+            <a:extLst>
+              <a:ext uri="{FF2B5EF4-FFF2-40B4-BE49-F238E27FC236}">
+                <a16:creationId xmlns:a16="http://schemas.microsoft.com/office/drawing/2014/main" id="{FF440A68-3700-644A-8BC8-70D989BF953D}"/>
+              </a:ext>
+            </a:extLst>
+          </p:cNvPr>
+          <p:cNvSpPr/>
+          <p:nvPr/>
+        </p:nvSpPr>
+        <p:spPr>
+          <a:xfrm rot="16200000">
+            <a:off x="1472424" y="914840"/>
+            <a:ext cx="523815" cy="453445"/>
+          </a:xfrm>
+          <a:prstGeom prst="flowChartPreparation">
+            <a:avLst/>
+          </a:prstGeom>
+          <a:solidFill>
+            <a:schemeClr val="accent1">
+              <a:lumMod val="20000"/>
+              <a:lumOff val="80000"/>
+            </a:schemeClr>
+          </a:solidFill>
+          <a:ln>
+            <a:noFill/>
+          </a:ln>
+        </p:spPr>
+        <p:style>
+          <a:lnRef idx="2">
+            <a:schemeClr val="accent1">
+              <a:shade val="50000"/>
+            </a:schemeClr>
+          </a:lnRef>
+          <a:fillRef idx="1">
+            <a:schemeClr val="accent1"/>
+          </a:fillRef>
+          <a:effectRef idx="0">
+            <a:schemeClr val="accent1"/>
+          </a:effectRef>
+          <a:fontRef idx="minor">
+            <a:schemeClr val="lt1"/>
+          </a:fontRef>
+        </p:style>
+        <p:txBody>
+          <a:bodyPr rtlCol="0" anchor="ctr"/>
+          <a:lstStyle/>
+          <a:p>
+            <a:pPr algn="ctr"/>
+            <a:endParaRPr lang="en-US"/>
+          </a:p>
+        </p:txBody>
+      </p:sp>
+      <p:sp>
+        <p:nvSpPr>
+          <p:cNvPr id="54" name="Preparation 53">
+            <a:extLst>
+              <a:ext uri="{FF2B5EF4-FFF2-40B4-BE49-F238E27FC236}">
+                <a16:creationId xmlns:a16="http://schemas.microsoft.com/office/drawing/2014/main" id="{499191B5-D579-BE43-8EEA-B6BA9C74692F}"/>
+              </a:ext>
+            </a:extLst>
+          </p:cNvPr>
+          <p:cNvSpPr/>
+          <p:nvPr/>
+        </p:nvSpPr>
+        <p:spPr>
+          <a:xfrm rot="16200000">
+            <a:off x="1718697" y="462796"/>
+            <a:ext cx="523815" cy="453445"/>
+          </a:xfrm>
+          <a:prstGeom prst="flowChartPreparation">
+            <a:avLst/>
+          </a:prstGeom>
+          <a:solidFill>
+            <a:schemeClr val="accent1">
+              <a:lumMod val="20000"/>
+              <a:lumOff val="80000"/>
+            </a:schemeClr>
+          </a:solidFill>
+          <a:ln>
+            <a:noFill/>
+          </a:ln>
+        </p:spPr>
+        <p:style>
+          <a:lnRef idx="2">
+            <a:schemeClr val="accent1">
+              <a:shade val="50000"/>
+            </a:schemeClr>
+          </a:lnRef>
+          <a:fillRef idx="1">
+            <a:schemeClr val="accent1"/>
+          </a:fillRef>
+          <a:effectRef idx="0">
+            <a:schemeClr val="accent1"/>
+          </a:effectRef>
+          <a:fontRef idx="minor">
+            <a:schemeClr val="lt1"/>
+          </a:fontRef>
+        </p:style>
+        <p:txBody>
+          <a:bodyPr rtlCol="0" anchor="ctr"/>
+          <a:lstStyle/>
+          <a:p>
+            <a:pPr algn="ctr"/>
+            <a:endParaRPr lang="en-US"/>
+          </a:p>
+        </p:txBody>
+      </p:sp>
+      <p:sp>
+        <p:nvSpPr>
+          <p:cNvPr id="55" name="Preparation 54">
+            <a:extLst>
+              <a:ext uri="{FF2B5EF4-FFF2-40B4-BE49-F238E27FC236}">
+                <a16:creationId xmlns:a16="http://schemas.microsoft.com/office/drawing/2014/main" id="{4FEC28B1-C10A-B743-97E9-AE87BE284A59}"/>
+              </a:ext>
+            </a:extLst>
+          </p:cNvPr>
+          <p:cNvSpPr/>
+          <p:nvPr/>
+        </p:nvSpPr>
+        <p:spPr>
+          <a:xfrm rot="16200000">
+            <a:off x="1226151" y="468775"/>
+            <a:ext cx="523815" cy="453445"/>
+          </a:xfrm>
+          <a:prstGeom prst="flowChartPreparation">
+            <a:avLst/>
+          </a:prstGeom>
+          <a:solidFill>
+            <a:schemeClr val="accent1">
+              <a:lumMod val="20000"/>
+              <a:lumOff val="80000"/>
+            </a:schemeClr>
+          </a:solidFill>
+          <a:ln>
+            <a:noFill/>
+          </a:ln>
+        </p:spPr>
+        <p:style>
+          <a:lnRef idx="2">
+            <a:schemeClr val="accent1">
+              <a:shade val="50000"/>
+            </a:schemeClr>
+          </a:lnRef>
+          <a:fillRef idx="1">
+            <a:schemeClr val="accent1"/>
+          </a:fillRef>
+          <a:effectRef idx="0">
+            <a:schemeClr val="accent1"/>
+          </a:effectRef>
+          <a:fontRef idx="minor">
+            <a:schemeClr val="lt1"/>
+          </a:fontRef>
+        </p:style>
+        <p:txBody>
+          <a:bodyPr rtlCol="0" anchor="ctr"/>
+          <a:lstStyle/>
+          <a:p>
+            <a:pPr algn="ctr"/>
+            <a:endParaRPr lang="en-US"/>
+          </a:p>
+        </p:txBody>
+      </p:sp>
+      <p:sp>
+        <p:nvSpPr>
+          <p:cNvPr id="2" name="Rectangle 1">
+            <a:extLst>
+              <a:ext uri="{FF2B5EF4-FFF2-40B4-BE49-F238E27FC236}">
+                <a16:creationId xmlns:a16="http://schemas.microsoft.com/office/drawing/2014/main" id="{7004E94E-9F94-F349-B21A-4BEDD7157635}"/>
+              </a:ext>
+            </a:extLst>
+          </p:cNvPr>
+          <p:cNvSpPr/>
+          <p:nvPr/>
+        </p:nvSpPr>
+        <p:spPr>
+          <a:xfrm>
+            <a:off x="1645101" y="1100279"/>
+            <a:ext cx="8901797" cy="2646878"/>
+          </a:xfrm>
+          <a:prstGeom prst="rect">
+            <a:avLst/>
+          </a:prstGeom>
+          <a:noFill/>
+        </p:spPr>
+        <p:txBody>
+          <a:bodyPr wrap="none" lIns="91440" tIns="45720" rIns="91440" bIns="45720">
+            <a:spAutoFit/>
+          </a:bodyPr>
+          <a:lstStyle/>
+          <a:p>
+            <a:pPr algn="ctr"/>
+            <a:r>
+              <a:rPr lang="en-US" sz="16600" dirty="0" err="1">
+                <a:ln w="0"/>
+                <a:effectLst>
+                  <a:outerShdw blurRad="38100" dist="19050" dir="2700000" algn="tl" rotWithShape="0">
+                    <a:schemeClr val="dk1">
+                      <a:alpha val="40000"/>
+                    </a:schemeClr>
+                  </a:outerShdw>
+                </a:effectLst>
+              </a:rPr>
+              <a:t>Enrich</a:t>
+            </a:r>
+            <a:r>
+              <a:rPr lang="en-US" sz="16600" b="1" dirty="0" err="1">
+                <a:ln w="0"/>
+                <a:solidFill>
+                  <a:schemeClr val="accent1"/>
+                </a:solidFill>
+                <a:effectLst>
+                  <a:outerShdw blurRad="38100" dist="25400" dir="5400000" algn="ctr" rotWithShape="0">
+                    <a:srgbClr val="6E747A">
+                      <a:alpha val="43000"/>
+                    </a:srgbClr>
+                  </a:outerShdw>
+                </a:effectLst>
+              </a:rPr>
+              <a:t>Seq</a:t>
+            </a:r>
+            <a:endParaRPr lang="en-US" sz="16600" b="1" dirty="0">
+              <a:ln w="0"/>
+              <a:solidFill>
+                <a:schemeClr val="accent1"/>
+              </a:solidFill>
+              <a:effectLst>
+                <a:outerShdw blurRad="38100" dist="25400" dir="5400000" algn="ctr" rotWithShape="0">
+                  <a:srgbClr val="6E747A">
+                    <a:alpha val="43000"/>
+                  </a:srgbClr>
+                </a:outerShdw>
+              </a:effectLst>
+            </a:endParaRPr>
+          </a:p>
+        </p:txBody>
+      </p:sp>
+      <p:sp>
+        <p:nvSpPr>
+          <p:cNvPr id="57" name="Preparation 56">
+            <a:extLst>
+              <a:ext uri="{FF2B5EF4-FFF2-40B4-BE49-F238E27FC236}">
+                <a16:creationId xmlns:a16="http://schemas.microsoft.com/office/drawing/2014/main" id="{02E262CE-2D04-834C-A2B0-E07221A5DDAD}"/>
+              </a:ext>
+            </a:extLst>
+          </p:cNvPr>
+          <p:cNvSpPr/>
+          <p:nvPr/>
+        </p:nvSpPr>
+        <p:spPr>
+          <a:xfrm rot="16200000">
+            <a:off x="2520180" y="3588517"/>
+            <a:ext cx="513712" cy="453448"/>
+          </a:xfrm>
+          <a:prstGeom prst="flowChartPreparation">
+            <a:avLst/>
+          </a:prstGeom>
+          <a:solidFill>
+            <a:schemeClr val="accent1">
+              <a:lumMod val="75000"/>
+            </a:schemeClr>
+          </a:solidFill>
+          <a:ln>
+            <a:solidFill>
+              <a:schemeClr val="tx1"/>
+            </a:solidFill>
+          </a:ln>
+        </p:spPr>
+        <p:style>
+          <a:lnRef idx="2">
+            <a:schemeClr val="accent1">
+              <a:shade val="50000"/>
+            </a:schemeClr>
+          </a:lnRef>
+          <a:fillRef idx="1">
+            <a:schemeClr val="accent1"/>
+          </a:fillRef>
+          <a:effectRef idx="0">
+            <a:schemeClr val="accent1"/>
+          </a:effectRef>
+          <a:fontRef idx="minor">
+            <a:schemeClr val="lt1"/>
+          </a:fontRef>
+        </p:style>
+        <p:txBody>
+          <a:bodyPr rtlCol="0" anchor="ctr"/>
+          <a:lstStyle/>
+          <a:p>
+            <a:pPr algn="ctr"/>
+            <a:endParaRPr lang="en-US"/>
+          </a:p>
+        </p:txBody>
+      </p:sp>
+      <p:sp>
+        <p:nvSpPr>
+          <p:cNvPr id="60" name="Preparation 59">
+            <a:extLst>
+              <a:ext uri="{FF2B5EF4-FFF2-40B4-BE49-F238E27FC236}">
+                <a16:creationId xmlns:a16="http://schemas.microsoft.com/office/drawing/2014/main" id="{02FC17F6-0CD5-3547-9466-7DB4009FC123}"/>
+              </a:ext>
+            </a:extLst>
+          </p:cNvPr>
+          <p:cNvSpPr/>
+          <p:nvPr/>
+        </p:nvSpPr>
+        <p:spPr>
+          <a:xfrm rot="16200000">
+            <a:off x="3286373" y="4040468"/>
+            <a:ext cx="513712" cy="453448"/>
+          </a:xfrm>
+          <a:prstGeom prst="flowChartPreparation">
+            <a:avLst/>
+          </a:prstGeom>
+          <a:solidFill>
+            <a:schemeClr val="accent1">
+              <a:lumMod val="75000"/>
+            </a:schemeClr>
+          </a:solidFill>
+          <a:ln>
+            <a:solidFill>
+              <a:schemeClr val="tx1"/>
+            </a:solidFill>
+          </a:ln>
+        </p:spPr>
+        <p:style>
+          <a:lnRef idx="2">
+            <a:schemeClr val="accent1">
+              <a:shade val="50000"/>
+            </a:schemeClr>
+          </a:lnRef>
+          <a:fillRef idx="1">
+            <a:schemeClr val="accent1"/>
+          </a:fillRef>
+          <a:effectRef idx="0">
+            <a:schemeClr val="accent1"/>
+          </a:effectRef>
+          <a:fontRef idx="minor">
+            <a:schemeClr val="lt1"/>
+          </a:fontRef>
+        </p:style>
+        <p:txBody>
+          <a:bodyPr rtlCol="0" anchor="ctr"/>
+          <a:lstStyle/>
+          <a:p>
+            <a:pPr algn="ctr"/>
+            <a:endParaRPr lang="en-US"/>
+          </a:p>
+        </p:txBody>
+      </p:sp>
+      <p:sp>
+        <p:nvSpPr>
+          <p:cNvPr id="61" name="Preparation 60">
+            <a:extLst>
+              <a:ext uri="{FF2B5EF4-FFF2-40B4-BE49-F238E27FC236}">
+                <a16:creationId xmlns:a16="http://schemas.microsoft.com/office/drawing/2014/main" id="{92F5000A-586F-794B-968B-DDECCDB3DCD7}"/>
+              </a:ext>
+            </a:extLst>
+          </p:cNvPr>
+          <p:cNvSpPr/>
+          <p:nvPr/>
+        </p:nvSpPr>
+        <p:spPr>
+          <a:xfrm rot="16200000">
+            <a:off x="3778979" y="4042992"/>
+            <a:ext cx="513712" cy="453448"/>
+          </a:xfrm>
+          <a:prstGeom prst="flowChartPreparation">
+            <a:avLst/>
+          </a:prstGeom>
+          <a:solidFill>
+            <a:schemeClr val="accent1">
+              <a:lumMod val="75000"/>
+            </a:schemeClr>
+          </a:solidFill>
+          <a:ln>
+            <a:solidFill>
+              <a:schemeClr val="tx1"/>
+            </a:solidFill>
+          </a:ln>
+        </p:spPr>
+        <p:style>
+          <a:lnRef idx="2">
+            <a:schemeClr val="accent1">
+              <a:shade val="50000"/>
+            </a:schemeClr>
+          </a:lnRef>
+          <a:fillRef idx="1">
+            <a:schemeClr val="accent1"/>
+          </a:fillRef>
+          <a:effectRef idx="0">
+            <a:schemeClr val="accent1"/>
+          </a:effectRef>
+          <a:fontRef idx="minor">
+            <a:schemeClr val="lt1"/>
+          </a:fontRef>
+        </p:style>
+        <p:txBody>
+          <a:bodyPr rtlCol="0" anchor="ctr"/>
+          <a:lstStyle/>
+          <a:p>
+            <a:pPr algn="ctr"/>
+            <a:endParaRPr lang="en-US"/>
+          </a:p>
+        </p:txBody>
+      </p:sp>
+      <p:sp>
+        <p:nvSpPr>
+          <p:cNvPr id="62" name="Preparation 61">
+            <a:extLst>
+              <a:ext uri="{FF2B5EF4-FFF2-40B4-BE49-F238E27FC236}">
+                <a16:creationId xmlns:a16="http://schemas.microsoft.com/office/drawing/2014/main" id="{22EB8794-A7F9-8247-8052-137AE8AFAABC}"/>
+              </a:ext>
+            </a:extLst>
+          </p:cNvPr>
+          <p:cNvSpPr/>
+          <p:nvPr/>
+        </p:nvSpPr>
+        <p:spPr>
+          <a:xfrm rot="16200000">
+            <a:off x="4283255" y="4042142"/>
+            <a:ext cx="513712" cy="453448"/>
+          </a:xfrm>
+          <a:prstGeom prst="flowChartPreparation">
+            <a:avLst/>
+          </a:prstGeom>
+          <a:solidFill>
+            <a:schemeClr val="accent1">
+              <a:lumMod val="75000"/>
+            </a:schemeClr>
+          </a:solidFill>
+          <a:ln>
+            <a:solidFill>
+              <a:schemeClr val="tx1"/>
+            </a:solidFill>
+          </a:ln>
+        </p:spPr>
+        <p:style>
+          <a:lnRef idx="2">
+            <a:schemeClr val="accent1">
+              <a:shade val="50000"/>
+            </a:schemeClr>
+          </a:lnRef>
+          <a:fillRef idx="1">
+            <a:schemeClr val="accent1"/>
+          </a:fillRef>
+          <a:effectRef idx="0">
+            <a:schemeClr val="accent1"/>
+          </a:effectRef>
+          <a:fontRef idx="minor">
+            <a:schemeClr val="lt1"/>
+          </a:fontRef>
+        </p:style>
+        <p:txBody>
+          <a:bodyPr rtlCol="0" anchor="ctr"/>
+          <a:lstStyle/>
+          <a:p>
+            <a:pPr algn="ctr"/>
+            <a:endParaRPr lang="en-US"/>
+          </a:p>
+        </p:txBody>
+      </p:sp>
+      <p:sp>
+        <p:nvSpPr>
+          <p:cNvPr id="63" name="Preparation 62">
+            <a:extLst>
+              <a:ext uri="{FF2B5EF4-FFF2-40B4-BE49-F238E27FC236}">
+                <a16:creationId xmlns:a16="http://schemas.microsoft.com/office/drawing/2014/main" id="{92BA3C41-E307-FA41-A6F2-CEAD6E1CAF27}"/>
+              </a:ext>
+            </a:extLst>
+          </p:cNvPr>
+          <p:cNvSpPr/>
+          <p:nvPr/>
+        </p:nvSpPr>
+        <p:spPr>
+          <a:xfrm rot="16200000">
+            <a:off x="3534904" y="4490882"/>
+            <a:ext cx="513712" cy="453448"/>
+          </a:xfrm>
+          <a:prstGeom prst="flowChartPreparation">
+            <a:avLst/>
+          </a:prstGeom>
+          <a:solidFill>
+            <a:schemeClr val="accent1">
+              <a:lumMod val="75000"/>
+            </a:schemeClr>
+          </a:solidFill>
+          <a:ln>
+            <a:solidFill>
+              <a:schemeClr val="tx1"/>
+            </a:solidFill>
+          </a:ln>
+        </p:spPr>
+        <p:style>
+          <a:lnRef idx="2">
+            <a:schemeClr val="accent1">
+              <a:shade val="50000"/>
+            </a:schemeClr>
+          </a:lnRef>
+          <a:fillRef idx="1">
+            <a:schemeClr val="accent1"/>
+          </a:fillRef>
+          <a:effectRef idx="0">
+            <a:schemeClr val="accent1"/>
+          </a:effectRef>
+          <a:fontRef idx="minor">
+            <a:schemeClr val="lt1"/>
+          </a:fontRef>
+        </p:style>
+        <p:txBody>
+          <a:bodyPr rtlCol="0" anchor="ctr"/>
+          <a:lstStyle/>
+          <a:p>
+            <a:pPr algn="ctr"/>
+            <a:endParaRPr lang="en-US"/>
+          </a:p>
+        </p:txBody>
+      </p:sp>
+      <p:sp>
+        <p:nvSpPr>
+          <p:cNvPr id="66" name="Preparation 65">
+            <a:extLst>
+              <a:ext uri="{FF2B5EF4-FFF2-40B4-BE49-F238E27FC236}">
+                <a16:creationId xmlns:a16="http://schemas.microsoft.com/office/drawing/2014/main" id="{989DF476-07C3-D543-BDA8-4962080B3872}"/>
+              </a:ext>
+            </a:extLst>
+          </p:cNvPr>
+          <p:cNvSpPr/>
+          <p:nvPr/>
+        </p:nvSpPr>
+        <p:spPr>
+          <a:xfrm rot="16200000">
+            <a:off x="4671705" y="1630176"/>
+            <a:ext cx="523815" cy="453445"/>
+          </a:xfrm>
+          <a:prstGeom prst="flowChartPreparation">
+            <a:avLst/>
+          </a:prstGeom>
+          <a:solidFill>
+            <a:schemeClr val="tx1"/>
+          </a:solidFill>
+          <a:ln>
+            <a:solidFill>
+              <a:schemeClr val="tx1"/>
+            </a:solidFill>
+          </a:ln>
+        </p:spPr>
+        <p:style>
+          <a:lnRef idx="2">
+            <a:schemeClr val="accent1">
+              <a:shade val="50000"/>
+            </a:schemeClr>
+          </a:lnRef>
+          <a:fillRef idx="1">
+            <a:schemeClr val="accent1"/>
+          </a:fillRef>
+          <a:effectRef idx="0">
+            <a:schemeClr val="accent1"/>
+          </a:effectRef>
+          <a:fontRef idx="minor">
+            <a:schemeClr val="lt1"/>
+          </a:fontRef>
+        </p:style>
+        <p:txBody>
+          <a:bodyPr rtlCol="0" anchor="ctr"/>
+          <a:lstStyle/>
+          <a:p>
+            <a:pPr algn="ctr"/>
+            <a:endParaRPr lang="en-US"/>
+          </a:p>
+        </p:txBody>
+      </p:sp>
+      <p:sp>
+        <p:nvSpPr>
+          <p:cNvPr id="3" name="Rectangle 2">
+            <a:extLst>
+              <a:ext uri="{FF2B5EF4-FFF2-40B4-BE49-F238E27FC236}">
+                <a16:creationId xmlns:a16="http://schemas.microsoft.com/office/drawing/2014/main" id="{5EA1E621-CC98-C241-B8B3-05538941069B}"/>
+              </a:ext>
+            </a:extLst>
+          </p:cNvPr>
+          <p:cNvSpPr/>
+          <p:nvPr/>
+        </p:nvSpPr>
+        <p:spPr>
+          <a:xfrm rot="14758483">
+            <a:off x="5029304" y="2849261"/>
+            <a:ext cx="84460" cy="322468"/>
+          </a:xfrm>
+          <a:prstGeom prst="rect">
+            <a:avLst/>
+          </a:prstGeom>
+          <a:solidFill>
+            <a:schemeClr val="tx1"/>
+          </a:solidFill>
+          <a:ln>
+            <a:solidFill>
+              <a:schemeClr val="tx1"/>
+            </a:solidFill>
+          </a:ln>
+        </p:spPr>
+        <p:style>
+          <a:lnRef idx="2">
+            <a:schemeClr val="accent1">
+              <a:shade val="50000"/>
+            </a:schemeClr>
+          </a:lnRef>
+          <a:fillRef idx="1">
+            <a:schemeClr val="accent1"/>
+          </a:fillRef>
+          <a:effectRef idx="0">
+            <a:schemeClr val="accent1"/>
+          </a:effectRef>
+          <a:fontRef idx="minor">
+            <a:schemeClr val="lt1"/>
+          </a:fontRef>
+        </p:style>
+        <p:txBody>
+          <a:bodyPr rtlCol="0" anchor="ctr"/>
+          <a:lstStyle/>
+          <a:p>
+            <a:pPr algn="ctr"/>
+            <a:endParaRPr lang="en-US"/>
+          </a:p>
+        </p:txBody>
+      </p:sp>
+      <p:sp>
+        <p:nvSpPr>
+          <p:cNvPr id="67" name="Rectangle 66">
+            <a:extLst>
+              <a:ext uri="{FF2B5EF4-FFF2-40B4-BE49-F238E27FC236}">
+                <a16:creationId xmlns:a16="http://schemas.microsoft.com/office/drawing/2014/main" id="{039E979A-9FCF-BF4A-8434-2A5BFD856550}"/>
+              </a:ext>
+            </a:extLst>
+          </p:cNvPr>
+          <p:cNvSpPr/>
+          <p:nvPr/>
+        </p:nvSpPr>
+        <p:spPr>
+          <a:xfrm rot="20256521">
+            <a:off x="5235974" y="2981263"/>
+            <a:ext cx="76826" cy="382366"/>
+          </a:xfrm>
+          <a:prstGeom prst="rect">
+            <a:avLst/>
+          </a:prstGeom>
+          <a:solidFill>
+            <a:schemeClr val="tx1"/>
+          </a:solidFill>
+          <a:ln>
+            <a:solidFill>
+              <a:schemeClr val="tx1"/>
+            </a:solidFill>
+          </a:ln>
+        </p:spPr>
+        <p:style>
+          <a:lnRef idx="2">
+            <a:schemeClr val="accent1">
+              <a:shade val="50000"/>
+            </a:schemeClr>
+          </a:lnRef>
+          <a:fillRef idx="1">
+            <a:schemeClr val="accent1"/>
+          </a:fillRef>
+          <a:effectRef idx="0">
+            <a:schemeClr val="accent1"/>
+          </a:effectRef>
+          <a:fontRef idx="minor">
+            <a:schemeClr val="lt1"/>
+          </a:fontRef>
+        </p:style>
+        <p:txBody>
+          <a:bodyPr rtlCol="0" anchor="ctr"/>
+          <a:lstStyle/>
+          <a:p>
+            <a:pPr algn="ctr"/>
+            <a:endParaRPr lang="en-US"/>
+          </a:p>
+        </p:txBody>
+      </p:sp>
+      <p:sp>
+        <p:nvSpPr>
+          <p:cNvPr id="68" name="Rectangle 67">
+            <a:extLst>
+              <a:ext uri="{FF2B5EF4-FFF2-40B4-BE49-F238E27FC236}">
+                <a16:creationId xmlns:a16="http://schemas.microsoft.com/office/drawing/2014/main" id="{1809E135-926B-6B4B-BC84-8293D5947DFF}"/>
+              </a:ext>
+            </a:extLst>
+          </p:cNvPr>
+          <p:cNvSpPr/>
+          <p:nvPr/>
+        </p:nvSpPr>
+        <p:spPr>
+          <a:xfrm rot="16482169">
+            <a:off x="5014448" y="2986634"/>
+            <a:ext cx="54238" cy="217423"/>
+          </a:xfrm>
+          <a:prstGeom prst="rect">
+            <a:avLst/>
+          </a:prstGeom>
+          <a:solidFill>
+            <a:schemeClr val="tx1"/>
+          </a:solidFill>
+          <a:ln>
+            <a:solidFill>
+              <a:schemeClr val="tx1"/>
+            </a:solidFill>
+          </a:ln>
+        </p:spPr>
+        <p:style>
+          <a:lnRef idx="2">
+            <a:schemeClr val="accent1">
+              <a:shade val="50000"/>
+            </a:schemeClr>
+          </a:lnRef>
+          <a:fillRef idx="1">
+            <a:schemeClr val="accent1"/>
+          </a:fillRef>
+          <a:effectRef idx="0">
+            <a:schemeClr val="accent1"/>
+          </a:effectRef>
+          <a:fontRef idx="minor">
+            <a:schemeClr val="lt1"/>
+          </a:fontRef>
+        </p:style>
+        <p:txBody>
+          <a:bodyPr rtlCol="0" anchor="ctr"/>
+          <a:lstStyle/>
+          <a:p>
+            <a:pPr algn="ctr"/>
+            <a:endParaRPr lang="en-US"/>
+          </a:p>
+        </p:txBody>
+      </p:sp>
+      <p:sp>
+        <p:nvSpPr>
+          <p:cNvPr id="69" name="Rectangle 68">
+            <a:extLst>
+              <a:ext uri="{FF2B5EF4-FFF2-40B4-BE49-F238E27FC236}">
+                <a16:creationId xmlns:a16="http://schemas.microsoft.com/office/drawing/2014/main" id="{A612D7A4-6721-A54E-8C23-6BCA91927709}"/>
+              </a:ext>
+            </a:extLst>
+          </p:cNvPr>
+          <p:cNvSpPr/>
+          <p:nvPr/>
+        </p:nvSpPr>
+        <p:spPr>
+          <a:xfrm rot="20256521">
+            <a:off x="5143122" y="3076656"/>
+            <a:ext cx="76826" cy="382366"/>
+          </a:xfrm>
+          <a:prstGeom prst="rect">
+            <a:avLst/>
+          </a:prstGeom>
+          <a:solidFill>
+            <a:schemeClr val="tx1"/>
+          </a:solidFill>
+          <a:ln>
+            <a:solidFill>
+              <a:schemeClr val="tx1"/>
+            </a:solidFill>
+          </a:ln>
+        </p:spPr>
+        <p:style>
+          <a:lnRef idx="2">
+            <a:schemeClr val="accent1">
+              <a:shade val="50000"/>
+            </a:schemeClr>
+          </a:lnRef>
+          <a:fillRef idx="1">
+            <a:schemeClr val="accent1"/>
+          </a:fillRef>
+          <a:effectRef idx="0">
+            <a:schemeClr val="accent1"/>
+          </a:effectRef>
+          <a:fontRef idx="minor">
+            <a:schemeClr val="lt1"/>
+          </a:fontRef>
+        </p:style>
+        <p:txBody>
+          <a:bodyPr rtlCol="0" anchor="ctr"/>
+          <a:lstStyle/>
+          <a:p>
+            <a:pPr algn="ctr"/>
+            <a:endParaRPr lang="en-US"/>
+          </a:p>
+        </p:txBody>
+      </p:sp>
+      <p:sp>
+        <p:nvSpPr>
+          <p:cNvPr id="70" name="Rectangle 69">
+            <a:extLst>
+              <a:ext uri="{FF2B5EF4-FFF2-40B4-BE49-F238E27FC236}">
+                <a16:creationId xmlns:a16="http://schemas.microsoft.com/office/drawing/2014/main" id="{6BAD1D22-9520-F046-9212-4ECBCBE5BF1A}"/>
+              </a:ext>
+            </a:extLst>
+          </p:cNvPr>
+          <p:cNvSpPr/>
+          <p:nvPr/>
+        </p:nvSpPr>
+        <p:spPr>
+          <a:xfrm rot="1226426">
+            <a:off x="4608802" y="3011873"/>
+            <a:ext cx="76826" cy="382366"/>
+          </a:xfrm>
+          <a:prstGeom prst="rect">
+            <a:avLst/>
+          </a:prstGeom>
+          <a:solidFill>
+            <a:schemeClr val="tx1"/>
+          </a:solidFill>
+          <a:ln>
+            <a:solidFill>
+              <a:schemeClr val="tx1"/>
+            </a:solidFill>
+          </a:ln>
+        </p:spPr>
+        <p:style>
+          <a:lnRef idx="2">
+            <a:schemeClr val="accent1">
+              <a:shade val="50000"/>
+            </a:schemeClr>
+          </a:lnRef>
+          <a:fillRef idx="1">
+            <a:schemeClr val="accent1"/>
+          </a:fillRef>
+          <a:effectRef idx="0">
+            <a:schemeClr val="accent1"/>
+          </a:effectRef>
+          <a:fontRef idx="minor">
+            <a:schemeClr val="lt1"/>
+          </a:fontRef>
+        </p:style>
+        <p:txBody>
+          <a:bodyPr rtlCol="0" anchor="ctr"/>
+          <a:lstStyle/>
+          <a:p>
+            <a:pPr algn="ctr"/>
+            <a:endParaRPr lang="en-US"/>
+          </a:p>
+        </p:txBody>
+      </p:sp>
+      <p:sp>
+        <p:nvSpPr>
+          <p:cNvPr id="71" name="Rectangle 70">
+            <a:extLst>
+              <a:ext uri="{FF2B5EF4-FFF2-40B4-BE49-F238E27FC236}">
+                <a16:creationId xmlns:a16="http://schemas.microsoft.com/office/drawing/2014/main" id="{60DAD9A7-E856-6347-A6CA-A917292C4C20}"/>
+              </a:ext>
+            </a:extLst>
+          </p:cNvPr>
+          <p:cNvSpPr/>
+          <p:nvPr/>
+        </p:nvSpPr>
+        <p:spPr>
+          <a:xfrm rot="17190699">
+            <a:off x="4760519" y="2930233"/>
+            <a:ext cx="53527" cy="238369"/>
+          </a:xfrm>
+          <a:prstGeom prst="rect">
+            <a:avLst/>
+          </a:prstGeom>
+          <a:solidFill>
+            <a:schemeClr val="tx1"/>
+          </a:solidFill>
+          <a:ln>
+            <a:solidFill>
+              <a:schemeClr val="tx1"/>
+            </a:solidFill>
+          </a:ln>
+        </p:spPr>
+        <p:style>
+          <a:lnRef idx="2">
+            <a:schemeClr val="accent1">
+              <a:shade val="50000"/>
+            </a:schemeClr>
+          </a:lnRef>
+          <a:fillRef idx="1">
+            <a:schemeClr val="accent1"/>
+          </a:fillRef>
+          <a:effectRef idx="0">
+            <a:schemeClr val="accent1"/>
+          </a:effectRef>
+          <a:fontRef idx="minor">
+            <a:schemeClr val="lt1"/>
+          </a:fontRef>
+        </p:style>
+        <p:txBody>
+          <a:bodyPr rtlCol="0" anchor="ctr"/>
+          <a:lstStyle/>
+          <a:p>
+            <a:pPr algn="ctr"/>
+            <a:endParaRPr lang="en-US"/>
+          </a:p>
+        </p:txBody>
+      </p:sp>
+      <p:sp>
+        <p:nvSpPr>
+          <p:cNvPr id="73" name="Rectangle 72">
+            <a:extLst>
+              <a:ext uri="{FF2B5EF4-FFF2-40B4-BE49-F238E27FC236}">
+                <a16:creationId xmlns:a16="http://schemas.microsoft.com/office/drawing/2014/main" id="{C559B59A-C18A-1344-86DE-17879610F696}"/>
+              </a:ext>
+            </a:extLst>
+          </p:cNvPr>
+          <p:cNvSpPr/>
+          <p:nvPr/>
+        </p:nvSpPr>
+        <p:spPr>
+          <a:xfrm rot="7332727">
+            <a:off x="4767734" y="2792041"/>
+            <a:ext cx="84460" cy="322468"/>
+          </a:xfrm>
+          <a:prstGeom prst="rect">
+            <a:avLst/>
+          </a:prstGeom>
+          <a:solidFill>
+            <a:schemeClr val="tx1"/>
+          </a:solidFill>
+          <a:ln>
+            <a:solidFill>
+              <a:schemeClr val="tx1"/>
+            </a:solidFill>
+          </a:ln>
+        </p:spPr>
+        <p:style>
+          <a:lnRef idx="2">
+            <a:schemeClr val="accent1">
+              <a:shade val="50000"/>
+            </a:schemeClr>
+          </a:lnRef>
+          <a:fillRef idx="1">
+            <a:schemeClr val="accent1"/>
+          </a:fillRef>
+          <a:effectRef idx="0">
+            <a:schemeClr val="accent1"/>
+          </a:effectRef>
+          <a:fontRef idx="minor">
+            <a:schemeClr val="lt1"/>
+          </a:fontRef>
+        </p:style>
+        <p:txBody>
+          <a:bodyPr rtlCol="0" anchor="ctr"/>
+          <a:lstStyle/>
+          <a:p>
+            <a:pPr algn="ctr"/>
+            <a:endParaRPr lang="en-US"/>
+          </a:p>
+        </p:txBody>
+      </p:sp>
+      <p:sp>
+        <p:nvSpPr>
+          <p:cNvPr id="74" name="Rectangle 73">
+            <a:extLst>
+              <a:ext uri="{FF2B5EF4-FFF2-40B4-BE49-F238E27FC236}">
+                <a16:creationId xmlns:a16="http://schemas.microsoft.com/office/drawing/2014/main" id="{53613104-2F89-3248-B02F-9407D98CE259}"/>
+              </a:ext>
+            </a:extLst>
+          </p:cNvPr>
+          <p:cNvSpPr/>
+          <p:nvPr/>
+        </p:nvSpPr>
+        <p:spPr>
+          <a:xfrm rot="1798345">
+            <a:off x="4559471" y="2805831"/>
+            <a:ext cx="76826" cy="382366"/>
+          </a:xfrm>
+          <a:prstGeom prst="rect">
+            <a:avLst/>
+          </a:prstGeom>
+          <a:solidFill>
+            <a:schemeClr val="tx1"/>
+          </a:solidFill>
+          <a:ln>
+            <a:solidFill>
+              <a:schemeClr val="tx1"/>
+            </a:solidFill>
+          </a:ln>
+        </p:spPr>
+        <p:style>
+          <a:lnRef idx="2">
+            <a:schemeClr val="accent1">
+              <a:shade val="50000"/>
+            </a:schemeClr>
+          </a:lnRef>
+          <a:fillRef idx="1">
+            <a:schemeClr val="accent1"/>
+          </a:fillRef>
+          <a:effectRef idx="0">
+            <a:schemeClr val="accent1"/>
+          </a:effectRef>
+          <a:fontRef idx="minor">
+            <a:schemeClr val="lt1"/>
+          </a:fontRef>
+        </p:style>
+        <p:txBody>
+          <a:bodyPr rtlCol="0" anchor="ctr"/>
+          <a:lstStyle/>
+          <a:p>
+            <a:pPr algn="ctr"/>
+            <a:endParaRPr lang="en-US"/>
+          </a:p>
+        </p:txBody>
+      </p:sp>
+    </p:spTree>
+    <p:extLst>
+      <p:ext uri="{BB962C8B-B14F-4D97-AF65-F5344CB8AC3E}">
+        <p14:creationId xmlns:p14="http://schemas.microsoft.com/office/powerpoint/2010/main" val="1033590094"/>
       </p:ext>
     </p:extLst>
   </p:cSld>

</xml_diff>